<commit_message>
Dr Whitmer lecture revised
</commit_message>
<xml_diff>
--- a/Radiation Units.pptx
+++ b/Radiation Units.pptx
@@ -406,7 +406,7 @@
           <a:p>
             <a:fld id="{64DE9856-807F-444D-8A2F-4923520B049C}" type="datetimeFigureOut">
               <a:rPr lang="en-US" smtClean="0"/>
-              <a:t>8/31/2020</a:t>
+              <a:t>9/1/2020</a:t>
             </a:fld>
             <a:endParaRPr lang="en-US"/>
           </a:p>
@@ -597,7 +597,7 @@
           <a:p>
             <a:fld id="{64DE9856-807F-444D-8A2F-4923520B049C}" type="datetimeFigureOut">
               <a:rPr lang="en-US" smtClean="0"/>
-              <a:t>8/31/2020</a:t>
+              <a:t>9/1/2020</a:t>
             </a:fld>
             <a:endParaRPr lang="en-US"/>
           </a:p>
@@ -782,7 +782,7 @@
           <a:p>
             <a:fld id="{64DE9856-807F-444D-8A2F-4923520B049C}" type="datetimeFigureOut">
               <a:rPr lang="en-US" smtClean="0"/>
-              <a:t>8/31/2020</a:t>
+              <a:t>9/1/2020</a:t>
             </a:fld>
             <a:endParaRPr lang="en-US"/>
           </a:p>
@@ -1045,7 +1045,7 @@
           <a:p>
             <a:fld id="{64DE9856-807F-444D-8A2F-4923520B049C}" type="datetimeFigureOut">
               <a:rPr lang="en-US" smtClean="0"/>
-              <a:t>8/31/2020</a:t>
+              <a:t>9/1/2020</a:t>
             </a:fld>
             <a:endParaRPr lang="en-US"/>
           </a:p>
@@ -1461,7 +1461,7 @@
           <a:p>
             <a:fld id="{64DE9856-807F-444D-8A2F-4923520B049C}" type="datetimeFigureOut">
               <a:rPr lang="en-US" smtClean="0"/>
-              <a:t>8/31/2020</a:t>
+              <a:t>9/1/2020</a:t>
             </a:fld>
             <a:endParaRPr lang="en-US"/>
           </a:p>
@@ -1703,7 +1703,7 @@
           <a:p>
             <a:fld id="{64DE9856-807F-444D-8A2F-4923520B049C}" type="datetimeFigureOut">
               <a:rPr lang="en-US" smtClean="0"/>
-              <a:t>8/31/2020</a:t>
+              <a:t>9/1/2020</a:t>
             </a:fld>
             <a:endParaRPr lang="en-US"/>
           </a:p>
@@ -1939,7 +1939,7 @@
           <a:p>
             <a:fld id="{64DE9856-807F-444D-8A2F-4923520B049C}" type="datetimeFigureOut">
               <a:rPr lang="en-US" smtClean="0"/>
-              <a:t>8/31/2020</a:t>
+              <a:t>9/1/2020</a:t>
             </a:fld>
             <a:endParaRPr lang="en-US"/>
           </a:p>
@@ -2134,7 +2134,7 @@
           <a:p>
             <a:fld id="{64DE9856-807F-444D-8A2F-4923520B049C}" type="datetimeFigureOut">
               <a:rPr lang="en-US" smtClean="0"/>
-              <a:t>8/31/2020</a:t>
+              <a:t>9/1/2020</a:t>
             </a:fld>
             <a:endParaRPr lang="en-US"/>
           </a:p>
@@ -2232,7 +2232,7 @@
           <a:p>
             <a:fld id="{64DE9856-807F-444D-8A2F-4923520B049C}" type="datetimeFigureOut">
               <a:rPr lang="en-US" smtClean="0"/>
-              <a:t>8/31/2020</a:t>
+              <a:t>9/1/2020</a:t>
             </a:fld>
             <a:endParaRPr lang="en-US"/>
           </a:p>
@@ -2368,7 +2368,7 @@
           <a:p>
             <a:fld id="{64DE9856-807F-444D-8A2F-4923520B049C}" type="datetimeFigureOut">
               <a:rPr lang="en-US" smtClean="0"/>
-              <a:t>8/31/2020</a:t>
+              <a:t>9/1/2020</a:t>
             </a:fld>
             <a:endParaRPr lang="en-US"/>
           </a:p>
@@ -2886,7 +2886,7 @@
           <a:p>
             <a:fld id="{64DE9856-807F-444D-8A2F-4923520B049C}" type="datetimeFigureOut">
               <a:rPr lang="en-US" smtClean="0"/>
-              <a:t>8/31/2020</a:t>
+              <a:t>9/1/2020</a:t>
             </a:fld>
             <a:endParaRPr lang="en-US"/>
           </a:p>
@@ -3147,7 +3147,7 @@
           <a:p>
             <a:fld id="{64DE9856-807F-444D-8A2F-4923520B049C}" type="datetimeFigureOut">
               <a:rPr lang="en-US" smtClean="0"/>
-              <a:t>8/31/2020</a:t>
+              <a:t>9/1/2020</a:t>
             </a:fld>
             <a:endParaRPr lang="en-US"/>
           </a:p>
@@ -4189,40 +4189,54 @@
         </p:nvSpPr>
         <p:spPr/>
         <p:txBody>
-          <a:bodyPr/>
-          <a:lstStyle/>
-          <a:p>
-            <a:r>
-              <a:rPr lang="en-US" dirty="0" smtClean="0"/>
+          <a:bodyPr>
+            <a:normAutofit/>
+          </a:bodyPr>
+          <a:lstStyle/>
+          <a:p>
+            <a:r>
+              <a:rPr lang="en-US" sz="2400" dirty="0" smtClean="0"/>
               <a:t>This is a measure of how much ionization takes place in a volume of air.</a:t>
             </a:r>
           </a:p>
           <a:p>
             <a:r>
-              <a:rPr lang="en-US" dirty="0" smtClean="0"/>
+              <a:rPr lang="en-US" sz="2400" dirty="0" smtClean="0"/>
               <a:t>1 Roentgen (R) = 2.58x10</a:t>
             </a:r>
             <a:r>
-              <a:rPr lang="en-US" baseline="30000" dirty="0" smtClean="0"/>
+              <a:rPr lang="en-US" sz="2400" baseline="30000" dirty="0" smtClean="0"/>
               <a:t>-4</a:t>
             </a:r>
             <a:r>
-              <a:rPr lang="en-US" dirty="0" smtClean="0"/>
+              <a:rPr lang="en-US" sz="2400" dirty="0" smtClean="0"/>
               <a:t> C/kg</a:t>
             </a:r>
           </a:p>
           <a:p>
             <a:r>
-              <a:rPr lang="en-US" dirty="0" smtClean="0"/>
+              <a:rPr lang="en-US" sz="2400" dirty="0" smtClean="0"/>
               <a:t>This is well suited to the easiest sort of radiation detector: the ionization chamber</a:t>
             </a:r>
           </a:p>
           <a:p>
             <a:pPr lvl="1"/>
             <a:r>
-              <a:rPr lang="en-US" dirty="0" smtClean="0"/>
-              <a:t>An ionization chamber uses relatively low voltage</a:t>
-            </a:r>
+              <a:rPr lang="en-US" sz="2000" dirty="0" smtClean="0"/>
+              <a:t>An ionization chamber uses relatively low </a:t>
+            </a:r>
+            <a:r>
+              <a:rPr lang="en-US" sz="2000" dirty="0" smtClean="0"/>
+              <a:t>voltage.</a:t>
+            </a:r>
+          </a:p>
+          <a:p>
+            <a:pPr lvl="1"/>
+            <a:r>
+              <a:rPr lang="en-US" sz="2000" dirty="0" smtClean="0"/>
+              <a:t>Measures the current resulting from ionization.</a:t>
+            </a:r>
+            <a:endParaRPr lang="en-US" sz="2000" dirty="0" smtClean="0"/>
           </a:p>
         </p:txBody>
       </p:sp>
@@ -4249,7 +4263,7 @@
         </p:blipFill>
         <p:spPr bwMode="auto">
           <a:xfrm>
-            <a:off x="3048000" y="4648200"/>
+            <a:off x="3276600" y="4495800"/>
             <a:ext cx="2743200" cy="1630045"/>
           </a:xfrm>
           <a:prstGeom prst="rect">
@@ -4362,8 +4376,21 @@
           <a:p>
             <a:r>
               <a:rPr lang="en-US" dirty="0" smtClean="0"/>
-              <a:t>This is a measure of how much energy is deposited in a material or tissue.</a:t>
-            </a:r>
+              <a:t>This is a measure of how much energy is deposited in a material or tissue</a:t>
+            </a:r>
+            <a:r>
+              <a:rPr lang="en-US" dirty="0" smtClean="0"/>
+              <a:t>. (Now called </a:t>
+            </a:r>
+            <a:r>
+              <a:rPr lang="en-US" dirty="0" err="1" smtClean="0"/>
+              <a:t>Kerma</a:t>
+            </a:r>
+            <a:r>
+              <a:rPr lang="en-US" dirty="0" smtClean="0"/>
+              <a:t>)</a:t>
+            </a:r>
+            <a:endParaRPr lang="en-US" dirty="0" smtClean="0"/>
           </a:p>
           <a:p>
             <a:r>
@@ -4677,7 +4704,7 @@
         <p:spPr/>
         <p:txBody>
           <a:bodyPr>
-            <a:normAutofit fontScale="92500" lnSpcReduction="10000"/>
+            <a:normAutofit fontScale="92500" lnSpcReduction="20000"/>
           </a:bodyPr>
           <a:lstStyle/>
           <a:p>
@@ -4691,8 +4718,21 @@
             </a:r>
             <a:r>
               <a:rPr lang="en-US" dirty="0" smtClean="0"/>
-              <a:t> is dangerous. It means about an 8% chance of developing cancer.  If it is received all at once it will cause radiation sickness, but not immediate death.</a:t>
-            </a:r>
+              <a:t> is dangerous. It means about an 8% chance of developing cancer.  If it is received all at once it will cause radiation sickness, but not immediate death</a:t>
+            </a:r>
+            <a:r>
+              <a:rPr lang="en-US" dirty="0" smtClean="0"/>
+              <a:t>. An acute dose (i.e. over a short period of time) of 5 </a:t>
+            </a:r>
+            <a:r>
+              <a:rPr lang="en-US" dirty="0" err="1" smtClean="0"/>
+              <a:t>Sv</a:t>
+            </a:r>
+            <a:r>
+              <a:rPr lang="en-US" dirty="0" smtClean="0"/>
+              <a:t> is deadly.</a:t>
+            </a:r>
+            <a:endParaRPr lang="en-US" dirty="0" smtClean="0"/>
           </a:p>
           <a:p>
             <a:r>
@@ -4712,7 +4752,15 @@
             </a:br>
             <a:r>
               <a:rPr lang="en-US" dirty="0" smtClean="0"/>
-              <a:t>A radiation worker must get less than 50 </a:t>
+              <a:t>A radiation worker </a:t>
+            </a:r>
+            <a:r>
+              <a:rPr lang="en-US" dirty="0" smtClean="0"/>
+              <a:t>is allowed </a:t>
+            </a:r>
+            <a:r>
+              <a:rPr lang="en-US" dirty="0" smtClean="0"/>
+              <a:t>less than 50 </a:t>
             </a:r>
             <a:r>
               <a:rPr lang="en-US" dirty="0" err="1" smtClean="0"/>
@@ -4756,6 +4804,13 @@
   <p:clrMapOvr>
     <a:masterClrMapping/>
   </p:clrMapOvr>
+  <p:timing>
+    <p:tnLst>
+      <p:par>
+        <p:cTn id="1" dur="indefinite" restart="never" nodeType="tmRoot"/>
+      </p:par>
+    </p:tnLst>
+  </p:timing>
 </p:sld>
 </file>
 
@@ -4982,6 +5037,13 @@
   <p:clrMapOvr>
     <a:masterClrMapping/>
   </p:clrMapOvr>
+  <p:timing>
+    <p:tnLst>
+      <p:par>
+        <p:cTn id="1" dur="indefinite" restart="never" nodeType="tmRoot"/>
+      </p:par>
+    </p:tnLst>
+  </p:timing>
 </p:sld>
 </file>
 
@@ -5187,6 +5249,13 @@
   <p:clrMapOvr>
     <a:masterClrMapping/>
   </p:clrMapOvr>
+  <p:timing>
+    <p:tnLst>
+      <p:par>
+        <p:cTn id="1" dur="indefinite" restart="never" nodeType="tmRoot"/>
+      </p:par>
+    </p:tnLst>
+  </p:timing>
 </p:sld>
 </file>
 

</xml_diff>